<commit_message>
The automation works, the formatting is yet to ajust
</commit_message>
<xml_diff>
--- a/pptx_template/vendor_template.pptx
+++ b/pptx_template/vendor_template.pptx
@@ -208,7 +208,7 @@
           <a:p>
             <a:fld id="{6EF88C90-DBF4-4DA8-A05F-48248FAFEFC2}" type="datetimeFigureOut">
               <a:rPr lang="zh-CN" altLang="en-US" smtClean="0"/>
-              <a:t>2025/1/23</a:t>
+              <a:t>2025/1/24</a:t>
             </a:fld>
             <a:endParaRPr lang="zh-CN" altLang="en-US"/>
           </a:p>
@@ -706,7 +706,7 @@
           <a:p>
             <a:fld id="{189B9A3E-F21D-4DCA-A909-B28D206D186F}" type="datetimeFigureOut">
               <a:rPr lang="zh-CN" altLang="en-US" smtClean="0"/>
-              <a:t>2025/1/23</a:t>
+              <a:t>2025/1/24</a:t>
             </a:fld>
             <a:endParaRPr lang="zh-CN" altLang="en-US"/>
           </a:p>
@@ -904,7 +904,7 @@
           <a:p>
             <a:fld id="{189B9A3E-F21D-4DCA-A909-B28D206D186F}" type="datetimeFigureOut">
               <a:rPr lang="zh-CN" altLang="en-US" smtClean="0"/>
-              <a:t>2025/1/23</a:t>
+              <a:t>2025/1/24</a:t>
             </a:fld>
             <a:endParaRPr lang="zh-CN" altLang="en-US"/>
           </a:p>
@@ -1112,7 +1112,7 @@
           <a:p>
             <a:fld id="{189B9A3E-F21D-4DCA-A909-B28D206D186F}" type="datetimeFigureOut">
               <a:rPr lang="zh-CN" altLang="en-US" smtClean="0"/>
-              <a:t>2025/1/23</a:t>
+              <a:t>2025/1/24</a:t>
             </a:fld>
             <a:endParaRPr lang="zh-CN" altLang="en-US"/>
           </a:p>
@@ -1310,7 +1310,7 @@
           <a:p>
             <a:fld id="{189B9A3E-F21D-4DCA-A909-B28D206D186F}" type="datetimeFigureOut">
               <a:rPr lang="zh-CN" altLang="en-US" smtClean="0"/>
-              <a:t>2025/1/23</a:t>
+              <a:t>2025/1/24</a:t>
             </a:fld>
             <a:endParaRPr lang="zh-CN" altLang="en-US"/>
           </a:p>
@@ -1585,7 +1585,7 @@
           <a:p>
             <a:fld id="{189B9A3E-F21D-4DCA-A909-B28D206D186F}" type="datetimeFigureOut">
               <a:rPr lang="zh-CN" altLang="en-US" smtClean="0"/>
-              <a:t>2025/1/23</a:t>
+              <a:t>2025/1/24</a:t>
             </a:fld>
             <a:endParaRPr lang="zh-CN" altLang="en-US"/>
           </a:p>
@@ -1850,7 +1850,7 @@
           <a:p>
             <a:fld id="{189B9A3E-F21D-4DCA-A909-B28D206D186F}" type="datetimeFigureOut">
               <a:rPr lang="zh-CN" altLang="en-US" smtClean="0"/>
-              <a:t>2025/1/23</a:t>
+              <a:t>2025/1/24</a:t>
             </a:fld>
             <a:endParaRPr lang="zh-CN" altLang="en-US"/>
           </a:p>
@@ -2262,7 +2262,7 @@
           <a:p>
             <a:fld id="{189B9A3E-F21D-4DCA-A909-B28D206D186F}" type="datetimeFigureOut">
               <a:rPr lang="zh-CN" altLang="en-US" smtClean="0"/>
-              <a:t>2025/1/23</a:t>
+              <a:t>2025/1/24</a:t>
             </a:fld>
             <a:endParaRPr lang="zh-CN" altLang="en-US"/>
           </a:p>
@@ -2403,7 +2403,7 @@
           <a:p>
             <a:fld id="{189B9A3E-F21D-4DCA-A909-B28D206D186F}" type="datetimeFigureOut">
               <a:rPr lang="zh-CN" altLang="en-US" smtClean="0"/>
-              <a:t>2025/1/23</a:t>
+              <a:t>2025/1/24</a:t>
             </a:fld>
             <a:endParaRPr lang="zh-CN" altLang="en-US"/>
           </a:p>
@@ -2516,7 +2516,7 @@
           <a:p>
             <a:fld id="{189B9A3E-F21D-4DCA-A909-B28D206D186F}" type="datetimeFigureOut">
               <a:rPr lang="zh-CN" altLang="en-US" smtClean="0"/>
-              <a:t>2025/1/23</a:t>
+              <a:t>2025/1/24</a:t>
             </a:fld>
             <a:endParaRPr lang="zh-CN" altLang="en-US"/>
           </a:p>
@@ -2827,7 +2827,7 @@
           <a:p>
             <a:fld id="{189B9A3E-F21D-4DCA-A909-B28D206D186F}" type="datetimeFigureOut">
               <a:rPr lang="zh-CN" altLang="en-US" smtClean="0"/>
-              <a:t>2025/1/23</a:t>
+              <a:t>2025/1/24</a:t>
             </a:fld>
             <a:endParaRPr lang="zh-CN" altLang="en-US"/>
           </a:p>
@@ -3115,7 +3115,7 @@
           <a:p>
             <a:fld id="{189B9A3E-F21D-4DCA-A909-B28D206D186F}" type="datetimeFigureOut">
               <a:rPr lang="zh-CN" altLang="en-US" smtClean="0"/>
-              <a:t>2025/1/23</a:t>
+              <a:t>2025/1/24</a:t>
             </a:fld>
             <a:endParaRPr lang="zh-CN" altLang="en-US"/>
           </a:p>
@@ -3356,7 +3356,7 @@
           <a:p>
             <a:fld id="{189B9A3E-F21D-4DCA-A909-B28D206D186F}" type="datetimeFigureOut">
               <a:rPr lang="zh-CN" altLang="en-US" smtClean="0"/>
-              <a:t>2025/1/23</a:t>
+              <a:t>2025/1/24</a:t>
             </a:fld>
             <a:endParaRPr lang="zh-CN" altLang="en-US"/>
           </a:p>
@@ -4391,8 +4391,8 @@
         </p:nvSpPr>
         <p:spPr>
           <a:xfrm>
-            <a:off x="507591" y="148441"/>
-            <a:ext cx="3429934" cy="369332"/>
+            <a:off x="507590" y="148442"/>
+            <a:ext cx="7726944" cy="276999"/>
           </a:xfrm>
           <a:prstGeom prst="rect">
             <a:avLst/>
@@ -4406,7 +4406,7 @@
           <a:lstStyle/>
           <a:p>
             <a:r>
-              <a:rPr lang="en-US" altLang="zh-CN" b="1" dirty="0">
+              <a:rPr lang="en-US" altLang="zh-CN" sz="1200" b="1" dirty="0">
                 <a:solidFill>
                   <a:schemeClr val="accent1">
                     <a:lumMod val="50000"/>
@@ -4418,7 +4418,7 @@
               </a:rPr>
               <a:t>[Timestamp]</a:t>
             </a:r>
-            <a:endParaRPr lang="zh-CN" altLang="en-US" b="1" dirty="0">
+            <a:endParaRPr lang="zh-CN" altLang="en-US" sz="1200" b="1" dirty="0">
               <a:solidFill>
                 <a:schemeClr val="accent1">
                   <a:lumMod val="50000"/>
@@ -5066,8 +5066,8 @@
         </p:nvSpPr>
         <p:spPr>
           <a:xfrm>
-            <a:off x="564276" y="619802"/>
-            <a:ext cx="2591788" cy="461665"/>
+            <a:off x="564275" y="619802"/>
+            <a:ext cx="2628907" cy="400110"/>
           </a:xfrm>
           <a:prstGeom prst="rect">
             <a:avLst/>
@@ -5082,34 +5082,14 @@
           <a:p>
             <a:pPr algn="ctr"/>
             <a:r>
-              <a:rPr lang="en-US" altLang="zh-CN" sz="2400" dirty="0">
+              <a:rPr lang="en-US" altLang="zh-CN" sz="2000" dirty="0">
                 <a:solidFill>
                   <a:srgbClr val="1A246A"/>
                 </a:solidFill>
                 <a:latin typeface="Arial" panose="020B0604020202020204" pitchFamily="34" charset="0"/>
                 <a:cs typeface="Arial" panose="020B0604020202020204" pitchFamily="34" charset="0"/>
               </a:rPr>
-              <a:t>[</a:t>
-            </a:r>
-            <a:r>
-              <a:rPr lang="en-US" altLang="zh-CN" sz="2400" dirty="0" err="1">
-                <a:solidFill>
-                  <a:srgbClr val="1A246A"/>
-                </a:solidFill>
-                <a:latin typeface="Arial" panose="020B0604020202020204" pitchFamily="34" charset="0"/>
-                <a:cs typeface="Arial" panose="020B0604020202020204" pitchFamily="34" charset="0"/>
-              </a:rPr>
-              <a:t>VendorName</a:t>
-            </a:r>
-            <a:r>
-              <a:rPr lang="en-US" altLang="zh-CN" sz="2400" dirty="0">
-                <a:solidFill>
-                  <a:srgbClr val="1A246A"/>
-                </a:solidFill>
-                <a:latin typeface="Arial" panose="020B0604020202020204" pitchFamily="34" charset="0"/>
-                <a:cs typeface="Arial" panose="020B0604020202020204" pitchFamily="34" charset="0"/>
-              </a:rPr>
-              <a:t>]</a:t>
+              <a:t>[Vendor Name]</a:t>
             </a:r>
           </a:p>
         </p:txBody>
@@ -5129,7 +5109,7 @@
         <p:spPr>
           <a:xfrm>
             <a:off x="3579838" y="698623"/>
-            <a:ext cx="767461" cy="307777"/>
+            <a:ext cx="767461" cy="276999"/>
           </a:xfrm>
           <a:prstGeom prst="rect">
             <a:avLst/>
@@ -5144,14 +5124,14 @@
           <a:p>
             <a:pPr algn="ctr"/>
             <a:r>
-              <a:rPr lang="en-US" altLang="zh-CN" sz="1400" dirty="0">
+              <a:rPr lang="en-US" altLang="zh-CN" sz="1200" dirty="0">
                 <a:solidFill>
                   <a:schemeClr val="bg1"/>
                 </a:solidFill>
               </a:rPr>
               <a:t>[Owner]</a:t>
             </a:r>
-            <a:endParaRPr lang="zh-CN" altLang="en-US" sz="1400" dirty="0">
+            <a:endParaRPr lang="zh-CN" altLang="en-US" sz="1200" dirty="0">
               <a:solidFill>
                 <a:schemeClr val="bg1"/>
               </a:solidFill>

</xml_diff>

<commit_message>
Tables and Charts correctly postioned
</commit_message>
<xml_diff>
--- a/pptx_template/vendor_template.pptx
+++ b/pptx_template/vendor_template.pptx
@@ -208,7 +208,7 @@
           <a:p>
             <a:fld id="{6EF88C90-DBF4-4DA8-A05F-48248FAFEFC2}" type="datetimeFigureOut">
               <a:rPr lang="zh-CN" altLang="en-US" smtClean="0"/>
-              <a:t>2025/1/24</a:t>
+              <a:t>2025/1/25</a:t>
             </a:fld>
             <a:endParaRPr lang="zh-CN" altLang="en-US"/>
           </a:p>
@@ -706,7 +706,7 @@
           <a:p>
             <a:fld id="{189B9A3E-F21D-4DCA-A909-B28D206D186F}" type="datetimeFigureOut">
               <a:rPr lang="zh-CN" altLang="en-US" smtClean="0"/>
-              <a:t>2025/1/24</a:t>
+              <a:t>2025/1/25</a:t>
             </a:fld>
             <a:endParaRPr lang="zh-CN" altLang="en-US"/>
           </a:p>
@@ -904,7 +904,7 @@
           <a:p>
             <a:fld id="{189B9A3E-F21D-4DCA-A909-B28D206D186F}" type="datetimeFigureOut">
               <a:rPr lang="zh-CN" altLang="en-US" smtClean="0"/>
-              <a:t>2025/1/24</a:t>
+              <a:t>2025/1/25</a:t>
             </a:fld>
             <a:endParaRPr lang="zh-CN" altLang="en-US"/>
           </a:p>
@@ -1112,7 +1112,7 @@
           <a:p>
             <a:fld id="{189B9A3E-F21D-4DCA-A909-B28D206D186F}" type="datetimeFigureOut">
               <a:rPr lang="zh-CN" altLang="en-US" smtClean="0"/>
-              <a:t>2025/1/24</a:t>
+              <a:t>2025/1/25</a:t>
             </a:fld>
             <a:endParaRPr lang="zh-CN" altLang="en-US"/>
           </a:p>
@@ -1310,7 +1310,7 @@
           <a:p>
             <a:fld id="{189B9A3E-F21D-4DCA-A909-B28D206D186F}" type="datetimeFigureOut">
               <a:rPr lang="zh-CN" altLang="en-US" smtClean="0"/>
-              <a:t>2025/1/24</a:t>
+              <a:t>2025/1/25</a:t>
             </a:fld>
             <a:endParaRPr lang="zh-CN" altLang="en-US"/>
           </a:p>
@@ -1585,7 +1585,7 @@
           <a:p>
             <a:fld id="{189B9A3E-F21D-4DCA-A909-B28D206D186F}" type="datetimeFigureOut">
               <a:rPr lang="zh-CN" altLang="en-US" smtClean="0"/>
-              <a:t>2025/1/24</a:t>
+              <a:t>2025/1/25</a:t>
             </a:fld>
             <a:endParaRPr lang="zh-CN" altLang="en-US"/>
           </a:p>
@@ -1850,7 +1850,7 @@
           <a:p>
             <a:fld id="{189B9A3E-F21D-4DCA-A909-B28D206D186F}" type="datetimeFigureOut">
               <a:rPr lang="zh-CN" altLang="en-US" smtClean="0"/>
-              <a:t>2025/1/24</a:t>
+              <a:t>2025/1/25</a:t>
             </a:fld>
             <a:endParaRPr lang="zh-CN" altLang="en-US"/>
           </a:p>
@@ -2262,7 +2262,7 @@
           <a:p>
             <a:fld id="{189B9A3E-F21D-4DCA-A909-B28D206D186F}" type="datetimeFigureOut">
               <a:rPr lang="zh-CN" altLang="en-US" smtClean="0"/>
-              <a:t>2025/1/24</a:t>
+              <a:t>2025/1/25</a:t>
             </a:fld>
             <a:endParaRPr lang="zh-CN" altLang="en-US"/>
           </a:p>
@@ -2403,7 +2403,7 @@
           <a:p>
             <a:fld id="{189B9A3E-F21D-4DCA-A909-B28D206D186F}" type="datetimeFigureOut">
               <a:rPr lang="zh-CN" altLang="en-US" smtClean="0"/>
-              <a:t>2025/1/24</a:t>
+              <a:t>2025/1/25</a:t>
             </a:fld>
             <a:endParaRPr lang="zh-CN" altLang="en-US"/>
           </a:p>
@@ -2516,7 +2516,7 @@
           <a:p>
             <a:fld id="{189B9A3E-F21D-4DCA-A909-B28D206D186F}" type="datetimeFigureOut">
               <a:rPr lang="zh-CN" altLang="en-US" smtClean="0"/>
-              <a:t>2025/1/24</a:t>
+              <a:t>2025/1/25</a:t>
             </a:fld>
             <a:endParaRPr lang="zh-CN" altLang="en-US"/>
           </a:p>
@@ -2827,7 +2827,7 @@
           <a:p>
             <a:fld id="{189B9A3E-F21D-4DCA-A909-B28D206D186F}" type="datetimeFigureOut">
               <a:rPr lang="zh-CN" altLang="en-US" smtClean="0"/>
-              <a:t>2025/1/24</a:t>
+              <a:t>2025/1/25</a:t>
             </a:fld>
             <a:endParaRPr lang="zh-CN" altLang="en-US"/>
           </a:p>
@@ -3115,7 +3115,7 @@
           <a:p>
             <a:fld id="{189B9A3E-F21D-4DCA-A909-B28D206D186F}" type="datetimeFigureOut">
               <a:rPr lang="zh-CN" altLang="en-US" smtClean="0"/>
-              <a:t>2025/1/24</a:t>
+              <a:t>2025/1/25</a:t>
             </a:fld>
             <a:endParaRPr lang="zh-CN" altLang="en-US"/>
           </a:p>
@@ -3356,7 +3356,7 @@
           <a:p>
             <a:fld id="{189B9A3E-F21D-4DCA-A909-B28D206D186F}" type="datetimeFigureOut">
               <a:rPr lang="zh-CN" altLang="en-US" smtClean="0"/>
-              <a:t>2025/1/24</a:t>
+              <a:t>2025/1/25</a:t>
             </a:fld>
             <a:endParaRPr lang="zh-CN" altLang="en-US"/>
           </a:p>
@@ -5067,7 +5067,7 @@
         <p:spPr>
           <a:xfrm>
             <a:off x="564275" y="619802"/>
-            <a:ext cx="2628907" cy="400110"/>
+            <a:ext cx="2628907" cy="523220"/>
           </a:xfrm>
           <a:prstGeom prst="rect">
             <a:avLst/>
@@ -5082,7 +5082,7 @@
           <a:p>
             <a:pPr algn="ctr"/>
             <a:r>
-              <a:rPr lang="en-US" altLang="zh-CN" sz="2000" dirty="0">
+              <a:rPr lang="en-US" altLang="zh-CN" sz="2800" dirty="0">
                 <a:solidFill>
                   <a:srgbClr val="1A246A"/>
                 </a:solidFill>

</xml_diff>

<commit_message>
- Refined the text replacement fun to elimiate errors in case of multi-line Replacement\n- Added the all_vendors_data.json to provide the source data for text replacement
</commit_message>
<xml_diff>
--- a/pptx_template/vendor_template.pptx
+++ b/pptx_template/vendor_template.pptx
@@ -5066,7 +5066,7 @@
         </p:nvSpPr>
         <p:spPr>
           <a:xfrm>
-            <a:off x="564275" y="619802"/>
+            <a:off x="575465" y="728014"/>
             <a:ext cx="2628907" cy="523220"/>
           </a:xfrm>
           <a:prstGeom prst="rect">
@@ -5168,18 +5168,30 @@
           <a:lstStyle/>
           <a:p>
             <a:r>
-              <a:rPr lang="en-US" altLang="zh-CN" sz="1200" dirty="0"/>
+              <a:rPr lang="en-US" altLang="zh-CN" sz="1200" dirty="0">
+                <a:latin typeface="arial" panose="020B0604020202020204" pitchFamily="34" charset="0"/>
+                <a:cs typeface="arial" panose="020B0604020202020204" pitchFamily="34" charset="0"/>
+              </a:rPr>
               <a:t>[</a:t>
             </a:r>
             <a:r>
-              <a:rPr lang="en-US" altLang="zh-CN" sz="1200" dirty="0" err="1"/>
+              <a:rPr lang="en-US" altLang="zh-CN" sz="1200" dirty="0" err="1">
+                <a:latin typeface="arial" panose="020B0604020202020204" pitchFamily="34" charset="0"/>
+                <a:cs typeface="arial" panose="020B0604020202020204" pitchFamily="34" charset="0"/>
+              </a:rPr>
               <a:t>KeyAccountManagers</a:t>
             </a:r>
             <a:r>
-              <a:rPr lang="en-US" altLang="zh-CN" sz="1200" dirty="0"/>
+              <a:rPr lang="en-US" altLang="zh-CN" sz="1200" dirty="0">
+                <a:latin typeface="arial" panose="020B0604020202020204" pitchFamily="34" charset="0"/>
+                <a:cs typeface="arial" panose="020B0604020202020204" pitchFamily="34" charset="0"/>
+              </a:rPr>
               <a:t>]</a:t>
             </a:r>
-            <a:endParaRPr lang="zh-CN" altLang="en-US" sz="1200" dirty="0"/>
+            <a:endParaRPr lang="zh-CN" altLang="en-US" sz="1200" dirty="0">
+              <a:latin typeface="arial" panose="020B0604020202020204" pitchFamily="34" charset="0"/>
+              <a:cs typeface="arial" panose="020B0604020202020204" pitchFamily="34" charset="0"/>
+            </a:endParaRPr>
           </a:p>
         </p:txBody>
       </p:sp>
@@ -5212,18 +5224,30 @@
           <a:lstStyle/>
           <a:p>
             <a:r>
-              <a:rPr lang="en-US" altLang="zh-CN" sz="1200" dirty="0"/>
+              <a:rPr lang="en-US" altLang="zh-CN" sz="1200" dirty="0">
+                <a:latin typeface="arial" panose="020B0604020202020204" pitchFamily="34" charset="0"/>
+                <a:cs typeface="arial" panose="020B0604020202020204" pitchFamily="34" charset="0"/>
+              </a:rPr>
               <a:t>[</a:t>
             </a:r>
             <a:r>
-              <a:rPr lang="en-US" altLang="zh-CN" sz="1200" dirty="0" err="1"/>
+              <a:rPr lang="en-US" altLang="zh-CN" sz="1200" dirty="0" err="1">
+                <a:latin typeface="arial" panose="020B0604020202020204" pitchFamily="34" charset="0"/>
+                <a:cs typeface="arial" panose="020B0604020202020204" pitchFamily="34" charset="0"/>
+              </a:rPr>
               <a:t>KeyStakeholders</a:t>
             </a:r>
             <a:r>
-              <a:rPr lang="en-US" altLang="zh-CN" sz="1200" dirty="0"/>
+              <a:rPr lang="en-US" altLang="zh-CN" sz="1200" dirty="0">
+                <a:latin typeface="arial" panose="020B0604020202020204" pitchFamily="34" charset="0"/>
+                <a:cs typeface="arial" panose="020B0604020202020204" pitchFamily="34" charset="0"/>
+              </a:rPr>
               <a:t>]</a:t>
             </a:r>
-            <a:endParaRPr lang="zh-CN" altLang="en-US" sz="1200" dirty="0"/>
+            <a:endParaRPr lang="zh-CN" altLang="en-US" sz="1200" dirty="0">
+              <a:latin typeface="arial" panose="020B0604020202020204" pitchFamily="34" charset="0"/>
+              <a:cs typeface="arial" panose="020B0604020202020204" pitchFamily="34" charset="0"/>
+            </a:endParaRPr>
           </a:p>
         </p:txBody>
       </p:sp>

</xml_diff>